<commit_message>
example files for 1609.2 and xml work.
</commit_message>
<xml_diff>
--- a/docs/acm.pptx
+++ b/docs/acm.pptx
@@ -5,11 +5,13 @@
     <p:sldMasterId id="2147483935" r:id="rId4"/>
   </p:sldMasterIdLst>
   <p:notesMasterIdLst>
-    <p:notesMasterId r:id="rId7"/>
+    <p:notesMasterId r:id="rId9"/>
   </p:notesMasterIdLst>
   <p:sldIdLst>
     <p:sldId id="362" r:id="rId5"/>
     <p:sldId id="363" r:id="rId6"/>
+    <p:sldId id="364" r:id="rId7"/>
+    <p:sldId id="365" r:id="rId8"/>
   </p:sldIdLst>
   <p:sldSz cx="12192000" cy="6858000"/>
   <p:notesSz cx="7010400" cy="9296400"/>
@@ -253,7 +255,7 @@
           <a:p>
             <a:fld id="{CCE18C67-FDED-7841-8480-BCDB5F03DF7A}" type="datetimeFigureOut">
               <a:rPr lang="en-US" smtClean="0"/>
-              <a:t>9/21/17</a:t>
+              <a:t>9/22/17</a:t>
             </a:fld>
             <a:endParaRPr lang="en-US" dirty="0"/>
           </a:p>
@@ -2391,11 +2393,6 @@
               </a:rPr>
               <a:t>Standard Static Source Files</a:t>
             </a:r>
-            <a:endParaRPr lang="en-US" sz="1200" dirty="0" smtClean="0">
-              <a:solidFill>
-                <a:schemeClr val="tx1"/>
-              </a:solidFill>
-            </a:endParaRPr>
           </a:p>
         </p:txBody>
       </p:sp>
@@ -2486,11 +2483,6 @@
               </a:rPr>
               <a:t>(e.g., J2735)</a:t>
             </a:r>
-            <a:endParaRPr lang="en-US" sz="1200" dirty="0" smtClean="0">
-              <a:solidFill>
-                <a:schemeClr val="tx1"/>
-              </a:solidFill>
-            </a:endParaRPr>
           </a:p>
         </p:txBody>
       </p:sp>
@@ -2924,11 +2916,6 @@
                 </a:rPr>
                 <a:t>(write to alternative form, e.g., XML)</a:t>
               </a:r>
-              <a:endParaRPr lang="en-US" sz="1200" dirty="0" smtClean="0">
-                <a:solidFill>
-                  <a:schemeClr val="tx1"/>
-                </a:solidFill>
-              </a:endParaRPr>
             </a:p>
           </p:txBody>
         </p:sp>
@@ -3712,7 +3699,6 @@
               <a:rPr lang="en-US" dirty="0" smtClean="0"/>
               <a:t>Applications / Executables</a:t>
             </a:r>
-            <a:endParaRPr lang="en-US" dirty="0" smtClean="0"/>
           </a:p>
         </p:txBody>
       </p:sp>
@@ -4092,11 +4078,6 @@
               </a:rPr>
               <a:t>Standard Static Source Files</a:t>
             </a:r>
-            <a:endParaRPr lang="en-US" sz="1200" dirty="0" smtClean="0">
-              <a:solidFill>
-                <a:schemeClr val="tx1"/>
-              </a:solidFill>
-            </a:endParaRPr>
           </a:p>
         </p:txBody>
       </p:sp>
@@ -4187,11 +4168,6 @@
               </a:rPr>
               <a:t>(e.g., J2735)</a:t>
             </a:r>
-            <a:endParaRPr lang="en-US" sz="1200" dirty="0" smtClean="0">
-              <a:solidFill>
-                <a:schemeClr val="tx1"/>
-              </a:solidFill>
-            </a:endParaRPr>
           </a:p>
         </p:txBody>
       </p:sp>
@@ -4671,13 +4647,6 @@
                 </a:rPr>
                 <a:t>(write to alternative form, e.g., XML)</a:t>
               </a:r>
-              <a:endParaRPr lang="en-US" sz="1200" dirty="0" smtClean="0">
-                <a:solidFill>
-                  <a:schemeClr val="bg2">
-                    <a:lumMod val="75000"/>
-                  </a:schemeClr>
-                </a:solidFill>
-              </a:endParaRPr>
             </a:p>
           </p:txBody>
         </p:sp>
@@ -5216,11 +5185,6 @@
               </a:rPr>
               <a:t>(library)</a:t>
             </a:r>
-            <a:endParaRPr lang="en-US" sz="1200" dirty="0" smtClean="0">
-              <a:solidFill>
-                <a:schemeClr val="tx1"/>
-              </a:solidFill>
-            </a:endParaRPr>
           </a:p>
         </p:txBody>
       </p:sp>
@@ -5352,11 +5316,6 @@
               </a:rPr>
               <a:t>(specific for now, e.g., J2735)</a:t>
             </a:r>
-            <a:endParaRPr lang="en-US" sz="1200" dirty="0" smtClean="0">
-              <a:solidFill>
-                <a:schemeClr val="bg1"/>
-              </a:solidFill>
-            </a:endParaRPr>
           </a:p>
         </p:txBody>
       </p:sp>
@@ -5690,11 +5649,6 @@
               </a:rPr>
               <a:t>(logging, testing)</a:t>
             </a:r>
-            <a:endParaRPr lang="en-US" sz="1200" dirty="0" smtClean="0">
-              <a:solidFill>
-                <a:schemeClr val="tx1"/>
-              </a:solidFill>
-            </a:endParaRPr>
           </a:p>
         </p:txBody>
       </p:sp>
@@ -5830,11 +5784,6 @@
                 </a:rPr>
                 <a:t>Module</a:t>
               </a:r>
-              <a:endParaRPr lang="en-US" sz="1200" dirty="0" smtClean="0">
-                <a:solidFill>
-                  <a:schemeClr val="tx1"/>
-                </a:solidFill>
-              </a:endParaRPr>
             </a:p>
           </p:txBody>
         </p:sp>
@@ -5905,11 +5854,6 @@
                 </a:rPr>
                 <a:t>Decoder</a:t>
               </a:r>
-              <a:endParaRPr lang="en-US" sz="1200" dirty="0" smtClean="0">
-                <a:solidFill>
-                  <a:schemeClr val="tx1"/>
-                </a:solidFill>
-              </a:endParaRPr>
             </a:p>
           </p:txBody>
         </p:sp>
@@ -6106,11 +6050,6 @@
               </a:rPr>
               <a:t>(ODE)</a:t>
             </a:r>
-            <a:endParaRPr lang="en-US" sz="1200" dirty="0" smtClean="0">
-              <a:solidFill>
-                <a:schemeClr val="tx1"/>
-              </a:solidFill>
-            </a:endParaRPr>
           </a:p>
         </p:txBody>
       </p:sp>
@@ -6913,6 +6852,353 @@
     <p:extLst>
       <p:ext uri="{BB962C8B-B14F-4D97-AF65-F5344CB8AC3E}">
         <p14:creationId xmlns:p14="http://schemas.microsoft.com/office/powerpoint/2010/main" val="165016739"/>
+      </p:ext>
+    </p:extLst>
+  </p:cSld>
+  <p:clrMapOvr>
+    <a:masterClrMapping/>
+  </p:clrMapOvr>
+</p:sld>
+</file>
+
+<file path=ppt/slides/slide3.xml><?xml version="1.0" encoding="utf-8"?>
+<p:sld xmlns:a="http://schemas.openxmlformats.org/drawingml/2006/main" xmlns:r="http://schemas.openxmlformats.org/officeDocument/2006/relationships" xmlns:p="http://schemas.openxmlformats.org/presentationml/2006/main">
+  <p:cSld>
+    <p:spTree>
+      <p:nvGrpSpPr>
+        <p:cNvPr id="1" name=""/>
+        <p:cNvGrpSpPr/>
+        <p:nvPr/>
+      </p:nvGrpSpPr>
+      <p:grpSpPr>
+        <a:xfrm>
+          <a:off x="0" y="0"/>
+          <a:ext cx="0" cy="0"/>
+          <a:chOff x="0" y="0"/>
+          <a:chExt cx="0" cy="0"/>
+        </a:xfrm>
+      </p:grpSpPr>
+      <p:sp>
+        <p:nvSpPr>
+          <p:cNvPr id="7" name="Title 6"/>
+          <p:cNvSpPr>
+            <a:spLocks noGrp="1"/>
+          </p:cNvSpPr>
+          <p:nvPr>
+            <p:ph type="title"/>
+          </p:nvPr>
+        </p:nvSpPr>
+        <p:spPr/>
+        <p:txBody>
+          <a:bodyPr/>
+          <a:lstStyle/>
+          <a:p>
+            <a:r>
+              <a:rPr lang="en-US" dirty="0" smtClean="0"/>
+              <a:t>ASN.1 Module Design Questions</a:t>
+            </a:r>
+            <a:endParaRPr lang="en-US" dirty="0"/>
+          </a:p>
+        </p:txBody>
+      </p:sp>
+      <p:sp>
+        <p:nvSpPr>
+          <p:cNvPr id="8" name="Content Placeholder 7"/>
+          <p:cNvSpPr>
+            <a:spLocks noGrp="1"/>
+          </p:cNvSpPr>
+          <p:nvPr>
+            <p:ph idx="1"/>
+          </p:nvPr>
+        </p:nvSpPr>
+        <p:spPr>
+          <a:xfrm>
+            <a:off x="268224" y="986186"/>
+            <a:ext cx="11523520" cy="5457144"/>
+          </a:xfrm>
+        </p:spPr>
+        <p:txBody>
+          <a:bodyPr/>
+          <a:lstStyle/>
+          <a:p>
+            <a:pPr marL="514350" indent="-514350">
+              <a:buFont typeface="+mj-lt"/>
+              <a:buAutoNum type="arabicPeriod"/>
+            </a:pPr>
+            <a:r>
+              <a:rPr lang="en-US" sz="1800" dirty="0" smtClean="0"/>
+              <a:t>Should we assume each record in a </a:t>
+            </a:r>
+            <a:r>
+              <a:rPr lang="en-US" sz="1800" dirty="0"/>
+              <a:t>K</a:t>
+            </a:r>
+            <a:r>
+              <a:rPr lang="en-US" sz="1800" dirty="0" smtClean="0"/>
+              <a:t>afka topic is one or more COMPLETE messages (ASN.1 or otherwise)?</a:t>
+            </a:r>
+          </a:p>
+          <a:p>
+            <a:pPr marL="908050" lvl="1" indent="-390525">
+              <a:buFont typeface="Arial" charset="0"/>
+              <a:buChar char="•"/>
+            </a:pPr>
+            <a:r>
+              <a:rPr lang="en-US" sz="1600" dirty="0" smtClean="0"/>
+              <a:t>Composition of binary messages is NOT needed.</a:t>
+            </a:r>
+          </a:p>
+          <a:p>
+            <a:pPr marL="908050" lvl="1" indent="-390525">
+              <a:buFont typeface="Arial" charset="0"/>
+              <a:buChar char="•"/>
+            </a:pPr>
+            <a:r>
+              <a:rPr lang="en-US" sz="1600" dirty="0" smtClean="0"/>
+              <a:t>If errors / partial messages are encountered message is ignored.</a:t>
+            </a:r>
+          </a:p>
+          <a:p>
+            <a:pPr marL="517525" indent="-508000">
+              <a:buFont typeface="+mj-lt"/>
+              <a:buAutoNum type="arabicPeriod"/>
+            </a:pPr>
+            <a:r>
+              <a:rPr lang="en-US" sz="1800" dirty="0"/>
+              <a:t>Will the capabilities of the module be selected at compile time? </a:t>
+            </a:r>
+            <a:r>
+              <a:rPr lang="en-US" sz="1800" dirty="0" smtClean="0"/>
+              <a:t/>
+            </a:r>
+            <a:br>
+              <a:rPr lang="en-US" sz="1800" dirty="0" smtClean="0"/>
+            </a:br>
+            <a:r>
+              <a:rPr lang="en-US" sz="1800" dirty="0" smtClean="0"/>
+              <a:t>Or</a:t>
+            </a:r>
+            <a:r>
+              <a:rPr lang="en-US" sz="1800" dirty="0"/>
+              <a:t>, should the capabilities of the module be selectable at </a:t>
+            </a:r>
+            <a:r>
+              <a:rPr lang="en-US" sz="1800" dirty="0" smtClean="0"/>
+              <a:t>run-time?</a:t>
+            </a:r>
+            <a:br>
+              <a:rPr lang="en-US" sz="1800" dirty="0" smtClean="0"/>
+            </a:br>
+            <a:r>
+              <a:rPr lang="en-US" sz="1800" dirty="0" smtClean="0"/>
+              <a:t>Or</a:t>
+            </a:r>
+            <a:r>
+              <a:rPr lang="en-US" sz="1800" dirty="0"/>
+              <a:t>, should the capabilities of the module be selectable during </a:t>
+            </a:r>
+            <a:r>
+              <a:rPr lang="en-US" sz="1800" dirty="0" smtClean="0"/>
+              <a:t>operation (Q3 below)?</a:t>
+            </a:r>
+            <a:endParaRPr lang="en-US" sz="1800" dirty="0"/>
+          </a:p>
+          <a:p>
+            <a:pPr marL="908050" lvl="1" indent="-390525">
+              <a:buFont typeface="Arial" charset="0"/>
+              <a:buChar char="•"/>
+            </a:pPr>
+            <a:r>
+              <a:rPr lang="en-US" sz="1600" dirty="0"/>
+              <a:t>We compiled a library and then a module to handle J2735 ASN.1 as input and J2735 XML as output.  That is all it does.</a:t>
+            </a:r>
+          </a:p>
+          <a:p>
+            <a:pPr marL="514350" indent="-514350">
+              <a:buFont typeface="+mj-lt"/>
+              <a:buAutoNum type="arabicPeriod"/>
+            </a:pPr>
+            <a:r>
+              <a:rPr lang="en-US" sz="1800" dirty="0" smtClean="0"/>
+              <a:t>Will the module’s input / output be a data record (ASN.1 binary, XML, JSON) ONLY or will it also contain metadata?</a:t>
+            </a:r>
+          </a:p>
+          <a:p>
+            <a:pPr marL="908050" lvl="1" indent="-390525">
+              <a:buFont typeface="Arial" charset="0"/>
+              <a:buChar char="•"/>
+            </a:pPr>
+            <a:r>
+              <a:rPr lang="en-US" sz="1600" dirty="0"/>
+              <a:t>Metadata could be used to have selectable input / output encoding/decoding.</a:t>
+            </a:r>
+          </a:p>
+          <a:p>
+            <a:pPr marL="908050" lvl="1" indent="-390525">
+              <a:buFont typeface="Arial" charset="0"/>
+              <a:buChar char="•"/>
+            </a:pPr>
+            <a:r>
+              <a:rPr lang="en-US" sz="1600" dirty="0"/>
+              <a:t>Good: One flexible tool / </a:t>
+            </a:r>
+            <a:r>
+              <a:rPr lang="en-US" sz="1600" dirty="0" smtClean="0"/>
+              <a:t>module. Give me stuff and the module figures out how to encode / decode and route it.</a:t>
+            </a:r>
+            <a:endParaRPr lang="en-US" sz="1600" dirty="0"/>
+          </a:p>
+          <a:p>
+            <a:pPr marL="908050" lvl="1" indent="-390525">
+              <a:buFont typeface="Arial" charset="0"/>
+              <a:buChar char="•"/>
+            </a:pPr>
+            <a:r>
+              <a:rPr lang="en-US" sz="1600" dirty="0"/>
+              <a:t>Bad: More complex module + addition of metadata</a:t>
+            </a:r>
+          </a:p>
+          <a:p>
+            <a:pPr marL="514350" indent="-514350">
+              <a:buFont typeface="+mj-lt"/>
+              <a:buAutoNum type="arabicPeriod"/>
+            </a:pPr>
+            <a:r>
+              <a:rPr lang="en-US" sz="1800" dirty="0" smtClean="0"/>
+              <a:t>Should we build a JSON encoder / decoder into the ASN.1 compiler / generator?</a:t>
+            </a:r>
+          </a:p>
+          <a:p>
+            <a:pPr marL="908050" lvl="1" indent="-390525">
+              <a:buFont typeface="Arial" charset="0"/>
+              <a:buChar char="•"/>
+            </a:pPr>
+            <a:r>
+              <a:rPr lang="en-US" sz="1600" dirty="0"/>
+              <a:t>Good: Avoid another encoding / decoding step, e.g., XML to JSON or JSON to XML.</a:t>
+            </a:r>
+          </a:p>
+          <a:p>
+            <a:pPr marL="908050" lvl="1" indent="-390525">
+              <a:buFont typeface="Arial" charset="0"/>
+              <a:buChar char="•"/>
+            </a:pPr>
+            <a:r>
+              <a:rPr lang="en-US" sz="1600" dirty="0"/>
+              <a:t>Bad: More in-depth coupling with open source ASN.1 compiler - generator code</a:t>
+            </a:r>
+            <a:r>
+              <a:rPr lang="en-US" sz="1600" dirty="0"/>
+              <a:t>.</a:t>
+            </a:r>
+          </a:p>
+          <a:p>
+            <a:pPr marL="514350" indent="-514350">
+              <a:buFont typeface="+mj-lt"/>
+              <a:buAutoNum type="arabicPeriod"/>
+            </a:pPr>
+            <a:endParaRPr lang="en-US" sz="1800" dirty="0" smtClean="0"/>
+          </a:p>
+          <a:p>
+            <a:pPr marL="909637" lvl="1" indent="-514350">
+              <a:buFont typeface="+mj-lt"/>
+              <a:buAutoNum type="arabicPeriod"/>
+            </a:pPr>
+            <a:endParaRPr lang="en-US" sz="1600" dirty="0" smtClean="0"/>
+          </a:p>
+          <a:p>
+            <a:pPr marL="514350" indent="-514350">
+              <a:buFont typeface="+mj-lt"/>
+              <a:buAutoNum type="arabicPeriod"/>
+            </a:pPr>
+            <a:endParaRPr lang="en-US" sz="1800" dirty="0"/>
+          </a:p>
+        </p:txBody>
+      </p:sp>
+    </p:spTree>
+    <p:extLst>
+      <p:ext uri="{BB962C8B-B14F-4D97-AF65-F5344CB8AC3E}">
+        <p14:creationId xmlns:p14="http://schemas.microsoft.com/office/powerpoint/2010/main" val="1359616498"/>
+      </p:ext>
+    </p:extLst>
+  </p:cSld>
+  <p:clrMapOvr>
+    <a:masterClrMapping/>
+  </p:clrMapOvr>
+</p:sld>
+</file>
+
+<file path=ppt/slides/slide4.xml><?xml version="1.0" encoding="utf-8"?>
+<p:sld xmlns:a="http://schemas.openxmlformats.org/drawingml/2006/main" xmlns:r="http://schemas.openxmlformats.org/officeDocument/2006/relationships" xmlns:p="http://schemas.openxmlformats.org/presentationml/2006/main">
+  <p:cSld>
+    <p:spTree>
+      <p:nvGrpSpPr>
+        <p:cNvPr id="1" name=""/>
+        <p:cNvGrpSpPr/>
+        <p:nvPr/>
+      </p:nvGrpSpPr>
+      <p:grpSpPr>
+        <a:xfrm>
+          <a:off x="0" y="0"/>
+          <a:ext cx="0" cy="0"/>
+          <a:chOff x="0" y="0"/>
+          <a:chExt cx="0" cy="0"/>
+        </a:xfrm>
+      </p:grpSpPr>
+      <p:sp>
+        <p:nvSpPr>
+          <p:cNvPr id="7" name="Title 6"/>
+          <p:cNvSpPr>
+            <a:spLocks noGrp="1"/>
+          </p:cNvSpPr>
+          <p:nvPr>
+            <p:ph type="title"/>
+          </p:nvPr>
+        </p:nvSpPr>
+        <p:spPr/>
+        <p:txBody>
+          <a:bodyPr/>
+          <a:lstStyle/>
+          <a:p>
+            <a:r>
+              <a:rPr lang="en-US" dirty="0" smtClean="0"/>
+              <a:t>ASN.1 Module Testing / Dev Questions</a:t>
+            </a:r>
+            <a:endParaRPr lang="en-US" dirty="0"/>
+          </a:p>
+        </p:txBody>
+      </p:sp>
+      <p:sp>
+        <p:nvSpPr>
+          <p:cNvPr id="8" name="Content Placeholder 7"/>
+          <p:cNvSpPr>
+            <a:spLocks noGrp="1"/>
+          </p:cNvSpPr>
+          <p:nvPr>
+            <p:ph idx="1"/>
+          </p:nvPr>
+        </p:nvSpPr>
+        <p:spPr/>
+        <p:txBody>
+          <a:bodyPr/>
+          <a:lstStyle/>
+          <a:p>
+            <a:pPr marL="514350" indent="-514350">
+              <a:buFont typeface="+mj-lt"/>
+              <a:buAutoNum type="arabicPeriod"/>
+            </a:pPr>
+            <a:r>
+              <a:rPr lang="en-US" dirty="0" smtClean="0"/>
+              <a:t>If a Kafka record is 2 or more messages, will those be faithfully be represented in the output encoding?</a:t>
+            </a:r>
+            <a:endParaRPr lang="en-US" dirty="0"/>
+          </a:p>
+        </p:txBody>
+      </p:sp>
+    </p:spTree>
+    <p:extLst>
+      <p:ext uri="{BB962C8B-B14F-4D97-AF65-F5344CB8AC3E}">
+        <p14:creationId xmlns:p14="http://schemas.microsoft.com/office/powerpoint/2010/main" val="290544236"/>
       </p:ext>
     </p:extLst>
   </p:cSld>

</xml_diff>